<commit_message>
Update Gun Violence Presentation.pptx
</commit_message>
<xml_diff>
--- a/Gun Violence Presentation.pptx
+++ b/Gun Violence Presentation.pptx
@@ -134,6 +134,11 @@
       </a:defRPr>
     </a:lvl9pPr>
   </p:defaultTextStyle>
+  <p:extLst>
+    <p:ext uri="{EFAFB233-063F-42B5-8137-9DF3F51BA10A}">
+      <p15:sldGuideLst xmlns:p15="http://schemas.microsoft.com/office/powerpoint/2012/main"/>
+    </p:ext>
+  </p:extLst>
 </p:presentation>
 </file>
 
@@ -219,7 +224,7 @@
           <a:p>
             <a:fld id="{CB3F76CD-7C5D-804D-884A-6811033804C6}" type="datetimeFigureOut">
               <a:rPr lang="en-US" smtClean="0"/>
-              <a:t>3/11/19</a:t>
+              <a:t>3/12/19</a:t>
             </a:fld>
             <a:endParaRPr lang="en-US"/>
           </a:p>
@@ -1465,7 +1470,7 @@
             <a:fld id="{B61BEF0D-F0BB-DE4B-95CE-6DB70DBA9567}" type="datetimeFigureOut">
               <a:rPr lang="en-US" dirty="0"/>
               <a:pPr/>
-              <a:t>3/11/19</a:t>
+              <a:t>3/12/19</a:t>
             </a:fld>
             <a:endParaRPr lang="en-US" dirty="0"/>
           </a:p>
@@ -1753,7 +1758,7 @@
             <a:fld id="{B61BEF0D-F0BB-DE4B-95CE-6DB70DBA9567}" type="datetimeFigureOut">
               <a:rPr lang="en-US" dirty="0"/>
               <a:pPr/>
-              <a:t>3/11/19</a:t>
+              <a:t>3/12/19</a:t>
             </a:fld>
             <a:endParaRPr lang="en-US" dirty="0"/>
           </a:p>
@@ -2009,7 +2014,7 @@
             <a:fld id="{B61BEF0D-F0BB-DE4B-95CE-6DB70DBA9567}" type="datetimeFigureOut">
               <a:rPr lang="en-US" dirty="0"/>
               <a:pPr/>
-              <a:t>3/11/19</a:t>
+              <a:t>3/12/19</a:t>
             </a:fld>
             <a:endParaRPr lang="en-US" dirty="0"/>
           </a:p>
@@ -2475,7 +2480,7 @@
             <a:fld id="{B61BEF0D-F0BB-DE4B-95CE-6DB70DBA9567}" type="datetimeFigureOut">
               <a:rPr lang="en-US" dirty="0"/>
               <a:pPr/>
-              <a:t>3/11/19</a:t>
+              <a:t>3/12/19</a:t>
             </a:fld>
             <a:endParaRPr lang="en-US" dirty="0"/>
           </a:p>
@@ -2652,7 +2657,7 @@
             <a:fld id="{B61BEF0D-F0BB-DE4B-95CE-6DB70DBA9567}" type="datetimeFigureOut">
               <a:rPr lang="en-US" dirty="0"/>
               <a:pPr/>
-              <a:t>3/11/19</a:t>
+              <a:t>3/12/19</a:t>
             </a:fld>
             <a:endParaRPr lang="en-US" dirty="0"/>
           </a:p>
@@ -3225,7 +3230,7 @@
             <a:fld id="{B61BEF0D-F0BB-DE4B-95CE-6DB70DBA9567}" type="datetimeFigureOut">
               <a:rPr lang="en-US" dirty="0"/>
               <a:pPr/>
-              <a:t>3/11/19</a:t>
+              <a:t>3/12/19</a:t>
             </a:fld>
             <a:endParaRPr lang="en-US" dirty="0"/>
           </a:p>
@@ -3554,7 +3559,7 @@
             <a:fld id="{B61BEF0D-F0BB-DE4B-95CE-6DB70DBA9567}" type="datetimeFigureOut">
               <a:rPr lang="en-US" dirty="0"/>
               <a:pPr/>
-              <a:t>3/11/19</a:t>
+              <a:t>3/12/19</a:t>
             </a:fld>
             <a:endParaRPr lang="en-US" dirty="0"/>
           </a:p>
@@ -3726,7 +3731,7 @@
             <a:fld id="{B61BEF0D-F0BB-DE4B-95CE-6DB70DBA9567}" type="datetimeFigureOut">
               <a:rPr lang="en-US" dirty="0"/>
               <a:pPr/>
-              <a:t>3/11/19</a:t>
+              <a:t>3/12/19</a:t>
             </a:fld>
             <a:endParaRPr lang="en-US" dirty="0"/>
           </a:p>
@@ -3903,7 +3908,7 @@
             <a:fld id="{B61BEF0D-F0BB-DE4B-95CE-6DB70DBA9567}" type="datetimeFigureOut">
               <a:rPr lang="en-US" dirty="0"/>
               <a:pPr/>
-              <a:t>3/11/19</a:t>
+              <a:t>3/12/19</a:t>
             </a:fld>
             <a:endParaRPr lang="en-US" dirty="0"/>
           </a:p>
@@ -4070,7 +4075,7 @@
             <a:fld id="{B61BEF0D-F0BB-DE4B-95CE-6DB70DBA9567}" type="datetimeFigureOut">
               <a:rPr lang="en-US" dirty="0"/>
               <a:pPr/>
-              <a:t>3/11/19</a:t>
+              <a:t>3/12/19</a:t>
             </a:fld>
             <a:endParaRPr lang="en-US" dirty="0"/>
           </a:p>
@@ -4324,7 +4329,7 @@
             <a:fld id="{B61BEF0D-F0BB-DE4B-95CE-6DB70DBA9567}" type="datetimeFigureOut">
               <a:rPr lang="en-US" dirty="0"/>
               <a:pPr/>
-              <a:t>3/11/19</a:t>
+              <a:t>3/12/19</a:t>
             </a:fld>
             <a:endParaRPr lang="en-US" dirty="0"/>
           </a:p>
@@ -4613,7 +4618,7 @@
             <a:fld id="{B61BEF0D-F0BB-DE4B-95CE-6DB70DBA9567}" type="datetimeFigureOut">
               <a:rPr lang="en-US" dirty="0"/>
               <a:pPr/>
-              <a:t>3/11/19</a:t>
+              <a:t>3/12/19</a:t>
             </a:fld>
             <a:endParaRPr lang="en-US" dirty="0"/>
           </a:p>
@@ -5040,7 +5045,7 @@
             <a:fld id="{B61BEF0D-F0BB-DE4B-95CE-6DB70DBA9567}" type="datetimeFigureOut">
               <a:rPr lang="en-US" dirty="0"/>
               <a:pPr/>
-              <a:t>3/11/19</a:t>
+              <a:t>3/12/19</a:t>
             </a:fld>
             <a:endParaRPr lang="en-US" dirty="0"/>
           </a:p>
@@ -5155,7 +5160,7 @@
             <a:fld id="{B61BEF0D-F0BB-DE4B-95CE-6DB70DBA9567}" type="datetimeFigureOut">
               <a:rPr lang="en-US" dirty="0"/>
               <a:pPr/>
-              <a:t>3/11/19</a:t>
+              <a:t>3/12/19</a:t>
             </a:fld>
             <a:endParaRPr lang="en-US" dirty="0"/>
           </a:p>
@@ -5247,7 +5252,7 @@
             <a:fld id="{B61BEF0D-F0BB-DE4B-95CE-6DB70DBA9567}" type="datetimeFigureOut">
               <a:rPr lang="en-US" dirty="0"/>
               <a:pPr/>
-              <a:t>3/11/19</a:t>
+              <a:t>3/12/19</a:t>
             </a:fld>
             <a:endParaRPr lang="en-US" dirty="0"/>
           </a:p>
@@ -5527,7 +5532,7 @@
             <a:fld id="{B61BEF0D-F0BB-DE4B-95CE-6DB70DBA9567}" type="datetimeFigureOut">
               <a:rPr lang="en-US" dirty="0"/>
               <a:pPr/>
-              <a:t>3/11/19</a:t>
+              <a:t>3/12/19</a:t>
             </a:fld>
             <a:endParaRPr lang="en-US" dirty="0"/>
           </a:p>
@@ -5815,7 +5820,7 @@
             <a:fld id="{B61BEF0D-F0BB-DE4B-95CE-6DB70DBA9567}" type="datetimeFigureOut">
               <a:rPr lang="en-US" dirty="0"/>
               <a:pPr/>
-              <a:t>3/11/19</a:t>
+              <a:t>3/12/19</a:t>
             </a:fld>
             <a:endParaRPr lang="en-US" dirty="0"/>
           </a:p>
@@ -6043,7 +6048,7 @@
             <a:fld id="{B61BEF0D-F0BB-DE4B-95CE-6DB70DBA9567}" type="datetimeFigureOut">
               <a:rPr lang="en-US" dirty="0"/>
               <a:pPr/>
-              <a:t>3/11/19</a:t>
+              <a:t>3/12/19</a:t>
             </a:fld>
             <a:endParaRPr lang="en-US" dirty="0"/>
           </a:p>
@@ -6848,7 +6853,7 @@
         </p:nvSpPr>
         <p:spPr>
           <a:xfrm>
-            <a:off x="1751012" y="5605818"/>
+            <a:off x="1751011" y="5225385"/>
             <a:ext cx="8676222" cy="522027"/>
           </a:xfrm>
         </p:spPr>
@@ -6857,10 +6862,10 @@
           <a:lstStyle/>
           <a:p>
             <a:r>
-              <a:rPr lang="en-US" smtClean="0"/>
+              <a:rPr lang="en-US" dirty="0" smtClean="0"/>
               <a:t>By Taban Yolo</a:t>
             </a:r>
-            <a:endParaRPr lang="en-US"/>
+            <a:endParaRPr lang="en-US" dirty="0"/>
           </a:p>
         </p:txBody>
       </p:sp>
@@ -7096,6 +7101,38 @@
           </a:prstGeom>
         </p:spPr>
       </p:pic>
+      <p:sp>
+        <p:nvSpPr>
+          <p:cNvPr id="4" name="TextBox 3"/>
+          <p:cNvSpPr txBox="1"/>
+          <p:nvPr/>
+        </p:nvSpPr>
+        <p:spPr>
+          <a:xfrm>
+            <a:off x="5522737" y="5676712"/>
+            <a:ext cx="2757054" cy="523220"/>
+          </a:xfrm>
+          <a:prstGeom prst="rect">
+            <a:avLst/>
+          </a:prstGeom>
+          <a:noFill/>
+        </p:spPr>
+        <p:txBody>
+          <a:bodyPr wrap="square" rtlCol="0">
+            <a:spAutoFit/>
+          </a:bodyPr>
+          <a:lstStyle/>
+          <a:p>
+            <a:r>
+              <a:rPr lang="en-US" sz="1400" dirty="0" smtClean="0"/>
+              <a:t>ETM 531</a:t>
+            </a:r>
+          </a:p>
+          <a:p>
+            <a:endParaRPr lang="en-US" sz="1400" dirty="0" smtClean="0"/>
+          </a:p>
+        </p:txBody>
+      </p:sp>
     </p:spTree>
     <p:extLst>
       <p:ext uri="{BB962C8B-B14F-4D97-AF65-F5344CB8AC3E}">
@@ -7449,14 +7486,14 @@
           <a:lstStyle/>
           <a:p>
             <a:r>
-              <a:rPr lang="en-US" sz="4800" b="1" smtClean="0">
+              <a:rPr lang="en-US" sz="4800" b="1" dirty="0" smtClean="0">
                 <a:solidFill>
                   <a:srgbClr val="FF0000"/>
                 </a:solidFill>
               </a:rPr>
               <a:t>46.7% CHANCE SOMEONE GETS KILLED</a:t>
             </a:r>
-            <a:endParaRPr lang="en-US" sz="4800" b="1">
+            <a:endParaRPr lang="en-US" sz="4800" b="1" dirty="0">
               <a:solidFill>
                 <a:srgbClr val="FF0000"/>
               </a:solidFill>
@@ -7487,10 +7524,10 @@
           <a:lstStyle/>
           <a:p>
             <a:r>
-              <a:rPr lang="en-US" sz="4000" b="1" smtClean="0"/>
+              <a:rPr lang="en-US" sz="4000" b="1" dirty="0" smtClean="0"/>
               <a:t>*</a:t>
             </a:r>
-            <a:endParaRPr lang="en-US" sz="4000" b="1"/>
+            <a:endParaRPr lang="en-US" sz="4000" b="1" dirty="0"/>
           </a:p>
         </p:txBody>
       </p:sp>
@@ -7507,9 +7544,308 @@
   <p:timing>
     <p:tnLst>
       <p:par>
-        <p:cTn id="1" dur="indefinite" restart="never" nodeType="tmRoot"/>
+        <p:cTn id="1" dur="indefinite" restart="never" nodeType="tmRoot">
+          <p:childTnLst>
+            <p:seq concurrent="1" nextAc="seek">
+              <p:cTn id="2" dur="indefinite" nodeType="mainSeq">
+                <p:childTnLst>
+                  <p:par>
+                    <p:cTn id="3" fill="hold">
+                      <p:stCondLst>
+                        <p:cond delay="indefinite"/>
+                      </p:stCondLst>
+                      <p:childTnLst>
+                        <p:par>
+                          <p:cTn id="4" fill="hold">
+                            <p:stCondLst>
+                              <p:cond delay="0"/>
+                            </p:stCondLst>
+                            <p:childTnLst>
+                              <p:par>
+                                <p:cTn id="5" presetID="1" presetClass="entr" presetSubtype="0" fill="hold" nodeType="clickEffect">
+                                  <p:stCondLst>
+                                    <p:cond delay="0"/>
+                                  </p:stCondLst>
+                                  <p:childTnLst>
+                                    <p:set>
+                                      <p:cBhvr>
+                                        <p:cTn id="6" dur="1" fill="hold">
+                                          <p:stCondLst>
+                                            <p:cond delay="0"/>
+                                          </p:stCondLst>
+                                        </p:cTn>
+                                        <p:tgtEl>
+                                          <p:spTgt spid="11"/>
+                                        </p:tgtEl>
+                                        <p:attrNameLst>
+                                          <p:attrName>style.visibility</p:attrName>
+                                        </p:attrNameLst>
+                                      </p:cBhvr>
+                                      <p:to>
+                                        <p:strVal val="visible"/>
+                                      </p:to>
+                                    </p:set>
+                                  </p:childTnLst>
+                                </p:cTn>
+                              </p:par>
+                            </p:childTnLst>
+                          </p:cTn>
+                        </p:par>
+                      </p:childTnLst>
+                    </p:cTn>
+                  </p:par>
+                  <p:par>
+                    <p:cTn id="7" fill="hold">
+                      <p:stCondLst>
+                        <p:cond delay="indefinite"/>
+                      </p:stCondLst>
+                      <p:childTnLst>
+                        <p:par>
+                          <p:cTn id="8" fill="hold">
+                            <p:stCondLst>
+                              <p:cond delay="0"/>
+                            </p:stCondLst>
+                            <p:childTnLst>
+                              <p:par>
+                                <p:cTn id="9" presetID="1" presetClass="entr" presetSubtype="0" fill="hold" nodeType="clickEffect">
+                                  <p:stCondLst>
+                                    <p:cond delay="0"/>
+                                  </p:stCondLst>
+                                  <p:childTnLst>
+                                    <p:set>
+                                      <p:cBhvr>
+                                        <p:cTn id="10" dur="1" fill="hold">
+                                          <p:stCondLst>
+                                            <p:cond delay="0"/>
+                                          </p:stCondLst>
+                                        </p:cTn>
+                                        <p:tgtEl>
+                                          <p:spTgt spid="13"/>
+                                        </p:tgtEl>
+                                        <p:attrNameLst>
+                                          <p:attrName>style.visibility</p:attrName>
+                                        </p:attrNameLst>
+                                      </p:cBhvr>
+                                      <p:to>
+                                        <p:strVal val="visible"/>
+                                      </p:to>
+                                    </p:set>
+                                  </p:childTnLst>
+                                </p:cTn>
+                              </p:par>
+                            </p:childTnLst>
+                          </p:cTn>
+                        </p:par>
+                      </p:childTnLst>
+                    </p:cTn>
+                  </p:par>
+                  <p:par>
+                    <p:cTn id="11" fill="hold">
+                      <p:stCondLst>
+                        <p:cond delay="indefinite"/>
+                      </p:stCondLst>
+                      <p:childTnLst>
+                        <p:par>
+                          <p:cTn id="12" fill="hold">
+                            <p:stCondLst>
+                              <p:cond delay="0"/>
+                            </p:stCondLst>
+                            <p:childTnLst>
+                              <p:par>
+                                <p:cTn id="13" presetID="1" presetClass="entr" presetSubtype="0" fill="hold" grpId="0" nodeType="clickEffect">
+                                  <p:stCondLst>
+                                    <p:cond delay="0"/>
+                                  </p:stCondLst>
+                                  <p:childTnLst>
+                                    <p:set>
+                                      <p:cBhvr>
+                                        <p:cTn id="14" dur="1" fill="hold">
+                                          <p:stCondLst>
+                                            <p:cond delay="0"/>
+                                          </p:stCondLst>
+                                        </p:cTn>
+                                        <p:tgtEl>
+                                          <p:spTgt spid="18"/>
+                                        </p:tgtEl>
+                                        <p:attrNameLst>
+                                          <p:attrName>style.visibility</p:attrName>
+                                        </p:attrNameLst>
+                                      </p:cBhvr>
+                                      <p:to>
+                                        <p:strVal val="visible"/>
+                                      </p:to>
+                                    </p:set>
+                                  </p:childTnLst>
+                                </p:cTn>
+                              </p:par>
+                            </p:childTnLst>
+                          </p:cTn>
+                        </p:par>
+                      </p:childTnLst>
+                    </p:cTn>
+                  </p:par>
+                  <p:par>
+                    <p:cTn id="15" fill="hold">
+                      <p:stCondLst>
+                        <p:cond delay="indefinite"/>
+                      </p:stCondLst>
+                      <p:childTnLst>
+                        <p:par>
+                          <p:cTn id="16" fill="hold">
+                            <p:stCondLst>
+                              <p:cond delay="0"/>
+                            </p:stCondLst>
+                            <p:childTnLst>
+                              <p:par>
+                                <p:cTn id="17" presetID="1" presetClass="entr" presetSubtype="0" fill="hold" grpId="0" nodeType="clickEffect">
+                                  <p:stCondLst>
+                                    <p:cond delay="0"/>
+                                  </p:stCondLst>
+                                  <p:childTnLst>
+                                    <p:set>
+                                      <p:cBhvr>
+                                        <p:cTn id="18" dur="1" fill="hold">
+                                          <p:stCondLst>
+                                            <p:cond delay="0"/>
+                                          </p:stCondLst>
+                                        </p:cTn>
+                                        <p:tgtEl>
+                                          <p:spTgt spid="15"/>
+                                        </p:tgtEl>
+                                        <p:attrNameLst>
+                                          <p:attrName>style.visibility</p:attrName>
+                                        </p:attrNameLst>
+                                      </p:cBhvr>
+                                      <p:to>
+                                        <p:strVal val="visible"/>
+                                      </p:to>
+                                    </p:set>
+                                  </p:childTnLst>
+                                </p:cTn>
+                              </p:par>
+                            </p:childTnLst>
+                          </p:cTn>
+                        </p:par>
+                      </p:childTnLst>
+                    </p:cTn>
+                  </p:par>
+                  <p:par>
+                    <p:cTn id="19" fill="hold">
+                      <p:stCondLst>
+                        <p:cond delay="indefinite"/>
+                      </p:stCondLst>
+                      <p:childTnLst>
+                        <p:par>
+                          <p:cTn id="20" fill="hold">
+                            <p:stCondLst>
+                              <p:cond delay="0"/>
+                            </p:stCondLst>
+                            <p:childTnLst>
+                              <p:par>
+                                <p:cTn id="21" presetID="1" presetClass="entr" presetSubtype="0" fill="hold" grpId="0" nodeType="clickEffect">
+                                  <p:stCondLst>
+                                    <p:cond delay="0"/>
+                                  </p:stCondLst>
+                                  <p:childTnLst>
+                                    <p:set>
+                                      <p:cBhvr>
+                                        <p:cTn id="22" dur="1" fill="hold">
+                                          <p:stCondLst>
+                                            <p:cond delay="0"/>
+                                          </p:stCondLst>
+                                        </p:cTn>
+                                        <p:tgtEl>
+                                          <p:spTgt spid="16"/>
+                                        </p:tgtEl>
+                                        <p:attrNameLst>
+                                          <p:attrName>style.visibility</p:attrName>
+                                        </p:attrNameLst>
+                                      </p:cBhvr>
+                                      <p:to>
+                                        <p:strVal val="visible"/>
+                                      </p:to>
+                                    </p:set>
+                                  </p:childTnLst>
+                                </p:cTn>
+                              </p:par>
+                            </p:childTnLst>
+                          </p:cTn>
+                        </p:par>
+                      </p:childTnLst>
+                    </p:cTn>
+                  </p:par>
+                  <p:par>
+                    <p:cTn id="23" fill="hold">
+                      <p:stCondLst>
+                        <p:cond delay="indefinite"/>
+                      </p:stCondLst>
+                      <p:childTnLst>
+                        <p:par>
+                          <p:cTn id="24" fill="hold">
+                            <p:stCondLst>
+                              <p:cond delay="0"/>
+                            </p:stCondLst>
+                            <p:childTnLst>
+                              <p:par>
+                                <p:cTn id="25" presetID="1" presetClass="entr" presetSubtype="0" fill="hold" grpId="0" nodeType="clickEffect">
+                                  <p:stCondLst>
+                                    <p:cond delay="0"/>
+                                  </p:stCondLst>
+                                  <p:childTnLst>
+                                    <p:set>
+                                      <p:cBhvr>
+                                        <p:cTn id="26" dur="1" fill="hold">
+                                          <p:stCondLst>
+                                            <p:cond delay="0"/>
+                                          </p:stCondLst>
+                                        </p:cTn>
+                                        <p:tgtEl>
+                                          <p:spTgt spid="17"/>
+                                        </p:tgtEl>
+                                        <p:attrNameLst>
+                                          <p:attrName>style.visibility</p:attrName>
+                                        </p:attrNameLst>
+                                      </p:cBhvr>
+                                      <p:to>
+                                        <p:strVal val="visible"/>
+                                      </p:to>
+                                    </p:set>
+                                  </p:childTnLst>
+                                </p:cTn>
+                              </p:par>
+                            </p:childTnLst>
+                          </p:cTn>
+                        </p:par>
+                      </p:childTnLst>
+                    </p:cTn>
+                  </p:par>
+                </p:childTnLst>
+              </p:cTn>
+              <p:prevCondLst>
+                <p:cond evt="onPrev" delay="0">
+                  <p:tgtEl>
+                    <p:sldTgt/>
+                  </p:tgtEl>
+                </p:cond>
+              </p:prevCondLst>
+              <p:nextCondLst>
+                <p:cond evt="onNext" delay="0">
+                  <p:tgtEl>
+                    <p:sldTgt/>
+                  </p:tgtEl>
+                </p:cond>
+              </p:nextCondLst>
+            </p:seq>
+          </p:childTnLst>
+        </p:cTn>
       </p:par>
     </p:tnLst>
+    <p:bldLst>
+      <p:bldP spid="15" grpId="0"/>
+      <p:bldP spid="16" grpId="0"/>
+      <p:bldP spid="17" grpId="0"/>
+      <p:bldP spid="18" grpId="0"/>
+    </p:bldLst>
   </p:timing>
 </p:sld>
 </file>

</xml_diff>